<commit_message>
ICPP: pack image clarification
git-svn-id: svn://localhost/subsetter/trunk@108 803cb72c-d64d-0410-ae51-a9422f8e9f96
</commit_message>
<xml_diff>
--- a/papers/2010-ICPP/images/pack.pptx
+++ b/papers/2010-ICPP/images/pack.pptx
@@ -289,7 +289,7 @@
             <a:fld id="{268DB075-DF6D-4B12-B5BB-CEB778FEBDC0}" type="datetimeFigureOut">
               <a:rPr lang="en-US" smtClean="0"/>
               <a:pPr/>
-              <a:t>2/19/2010</a:t>
+              <a:t>3/2/2010</a:t>
             </a:fld>
             <a:endParaRPr lang="en-US"/>
           </a:p>
@@ -456,7 +456,7 @@
             <a:fld id="{268DB075-DF6D-4B12-B5BB-CEB778FEBDC0}" type="datetimeFigureOut">
               <a:rPr lang="en-US" smtClean="0"/>
               <a:pPr/>
-              <a:t>2/19/2010</a:t>
+              <a:t>3/2/2010</a:t>
             </a:fld>
             <a:endParaRPr lang="en-US"/>
           </a:p>
@@ -633,7 +633,7 @@
             <a:fld id="{268DB075-DF6D-4B12-B5BB-CEB778FEBDC0}" type="datetimeFigureOut">
               <a:rPr lang="en-US" smtClean="0"/>
               <a:pPr/>
-              <a:t>2/19/2010</a:t>
+              <a:t>3/2/2010</a:t>
             </a:fld>
             <a:endParaRPr lang="en-US"/>
           </a:p>
@@ -800,7 +800,7 @@
             <a:fld id="{268DB075-DF6D-4B12-B5BB-CEB778FEBDC0}" type="datetimeFigureOut">
               <a:rPr lang="en-US" smtClean="0"/>
               <a:pPr/>
-              <a:t>2/19/2010</a:t>
+              <a:t>3/2/2010</a:t>
             </a:fld>
             <a:endParaRPr lang="en-US"/>
           </a:p>
@@ -1043,7 +1043,7 @@
             <a:fld id="{268DB075-DF6D-4B12-B5BB-CEB778FEBDC0}" type="datetimeFigureOut">
               <a:rPr lang="en-US" smtClean="0"/>
               <a:pPr/>
-              <a:t>2/19/2010</a:t>
+              <a:t>3/2/2010</a:t>
             </a:fld>
             <a:endParaRPr lang="en-US"/>
           </a:p>
@@ -1328,7 +1328,7 @@
             <a:fld id="{268DB075-DF6D-4B12-B5BB-CEB778FEBDC0}" type="datetimeFigureOut">
               <a:rPr lang="en-US" smtClean="0"/>
               <a:pPr/>
-              <a:t>2/19/2010</a:t>
+              <a:t>3/2/2010</a:t>
             </a:fld>
             <a:endParaRPr lang="en-US"/>
           </a:p>
@@ -1747,7 +1747,7 @@
             <a:fld id="{268DB075-DF6D-4B12-B5BB-CEB778FEBDC0}" type="datetimeFigureOut">
               <a:rPr lang="en-US" smtClean="0"/>
               <a:pPr/>
-              <a:t>2/19/2010</a:t>
+              <a:t>3/2/2010</a:t>
             </a:fld>
             <a:endParaRPr lang="en-US"/>
           </a:p>
@@ -1862,7 +1862,7 @@
             <a:fld id="{268DB075-DF6D-4B12-B5BB-CEB778FEBDC0}" type="datetimeFigureOut">
               <a:rPr lang="en-US" smtClean="0"/>
               <a:pPr/>
-              <a:t>2/19/2010</a:t>
+              <a:t>3/2/2010</a:t>
             </a:fld>
             <a:endParaRPr lang="en-US"/>
           </a:p>
@@ -1954,7 +1954,7 @@
             <a:fld id="{268DB075-DF6D-4B12-B5BB-CEB778FEBDC0}" type="datetimeFigureOut">
               <a:rPr lang="en-US" smtClean="0"/>
               <a:pPr/>
-              <a:t>2/19/2010</a:t>
+              <a:t>3/2/2010</a:t>
             </a:fld>
             <a:endParaRPr lang="en-US"/>
           </a:p>
@@ -2228,7 +2228,7 @@
             <a:fld id="{268DB075-DF6D-4B12-B5BB-CEB778FEBDC0}" type="datetimeFigureOut">
               <a:rPr lang="en-US" smtClean="0"/>
               <a:pPr/>
-              <a:t>2/19/2010</a:t>
+              <a:t>3/2/2010</a:t>
             </a:fld>
             <a:endParaRPr lang="en-US"/>
           </a:p>
@@ -2478,7 +2478,7 @@
             <a:fld id="{268DB075-DF6D-4B12-B5BB-CEB778FEBDC0}" type="datetimeFigureOut">
               <a:rPr lang="en-US" smtClean="0"/>
               <a:pPr/>
-              <a:t>2/19/2010</a:t>
+              <a:t>3/2/2010</a:t>
             </a:fld>
             <a:endParaRPr lang="en-US"/>
           </a:p>
@@ -2688,7 +2688,7 @@
             <a:fld id="{268DB075-DF6D-4B12-B5BB-CEB778FEBDC0}" type="datetimeFigureOut">
               <a:rPr lang="en-US" smtClean="0"/>
               <a:pPr/>
-              <a:t>2/19/2010</a:t>
+              <a:t>3/2/2010</a:t>
             </a:fld>
             <a:endParaRPr lang="en-US"/>
           </a:p>
@@ -3250,7 +3250,11 @@
           <a:lstStyle/>
           <a:p>
             <a:pPr algn="ctr"/>
-            <a:endParaRPr lang="en-US"/>
+            <a:r>
+              <a:rPr lang="en-US" dirty="0" smtClean="0"/>
+              <a:t>0</a:t>
+            </a:r>
+            <a:endParaRPr lang="en-US" dirty="0"/>
           </a:p>
         </p:txBody>
       </p:sp>
@@ -3961,7 +3965,11 @@
           <a:lstStyle/>
           <a:p>
             <a:pPr algn="ctr"/>
-            <a:endParaRPr lang="en-US"/>
+            <a:r>
+              <a:rPr lang="en-US" dirty="0" smtClean="0"/>
+              <a:t>0</a:t>
+            </a:r>
+            <a:endParaRPr lang="en-US" dirty="0"/>
           </a:p>
         </p:txBody>
       </p:sp>
@@ -4002,7 +4010,11 @@
           <a:lstStyle/>
           <a:p>
             <a:pPr algn="ctr"/>
-            <a:endParaRPr lang="en-US"/>
+            <a:r>
+              <a:rPr lang="en-US" dirty="0" smtClean="0"/>
+              <a:t>3</a:t>
+            </a:r>
+            <a:endParaRPr lang="en-US" dirty="0"/>
           </a:p>
         </p:txBody>
       </p:sp>
@@ -4043,7 +4055,11 @@
           <a:lstStyle/>
           <a:p>
             <a:pPr algn="ctr"/>
-            <a:endParaRPr lang="en-US"/>
+            <a:r>
+              <a:rPr lang="en-US" dirty="0" smtClean="0"/>
+              <a:t>2</a:t>
+            </a:r>
+            <a:endParaRPr lang="en-US" dirty="0"/>
           </a:p>
         </p:txBody>
       </p:sp>
@@ -4135,47 +4151,6 @@
       </p:sp>
       <p:sp>
         <p:nvSpPr>
-          <p:cNvPr id="74" name="Rectangle 73"/>
-          <p:cNvSpPr/>
-          <p:nvPr/>
-        </p:nvSpPr>
-        <p:spPr>
-          <a:xfrm>
-            <a:off x="4951546" y="2446880"/>
-            <a:ext cx="182880" cy="182880"/>
-          </a:xfrm>
-          <a:prstGeom prst="rect">
-            <a:avLst/>
-          </a:prstGeom>
-          <a:solidFill>
-            <a:schemeClr val="accent5"/>
-          </a:solidFill>
-        </p:spPr>
-        <p:style>
-          <a:lnRef idx="1">
-            <a:schemeClr val="accent1"/>
-          </a:lnRef>
-          <a:fillRef idx="3">
-            <a:schemeClr val="accent1"/>
-          </a:fillRef>
-          <a:effectRef idx="2">
-            <a:schemeClr val="accent1"/>
-          </a:effectRef>
-          <a:fontRef idx="minor">
-            <a:schemeClr val="lt1"/>
-          </a:fontRef>
-        </p:style>
-        <p:txBody>
-          <a:bodyPr rtlCol="0" anchor="ctr"/>
-          <a:lstStyle/>
-          <a:p>
-            <a:pPr algn="ctr"/>
-            <a:endParaRPr lang="en-US"/>
-          </a:p>
-        </p:txBody>
-      </p:sp>
-      <p:sp>
-        <p:nvSpPr>
           <p:cNvPr id="77" name="Rectangle 76"/>
           <p:cNvSpPr/>
           <p:nvPr/>
@@ -4262,47 +4237,6 @@
       </p:sp>
       <p:sp>
         <p:nvSpPr>
-          <p:cNvPr id="82" name="Rectangle 81"/>
-          <p:cNvSpPr/>
-          <p:nvPr/>
-        </p:nvSpPr>
-        <p:spPr>
-          <a:xfrm>
-            <a:off x="4951546" y="2694897"/>
-            <a:ext cx="182880" cy="182880"/>
-          </a:xfrm>
-          <a:prstGeom prst="rect">
-            <a:avLst/>
-          </a:prstGeom>
-          <a:solidFill>
-            <a:schemeClr val="accent5"/>
-          </a:solidFill>
-        </p:spPr>
-        <p:style>
-          <a:lnRef idx="1">
-            <a:schemeClr val="accent1"/>
-          </a:lnRef>
-          <a:fillRef idx="3">
-            <a:schemeClr val="accent1"/>
-          </a:fillRef>
-          <a:effectRef idx="2">
-            <a:schemeClr val="accent1"/>
-          </a:effectRef>
-          <a:fontRef idx="minor">
-            <a:schemeClr val="lt1"/>
-          </a:fontRef>
-        </p:style>
-        <p:txBody>
-          <a:bodyPr rtlCol="0" anchor="ctr"/>
-          <a:lstStyle/>
-          <a:p>
-            <a:pPr algn="ctr"/>
-            <a:endParaRPr lang="en-US"/>
-          </a:p>
-        </p:txBody>
-      </p:sp>
-      <p:sp>
-        <p:nvSpPr>
           <p:cNvPr id="83" name="Rectangle 82"/>
           <p:cNvSpPr/>
           <p:nvPr/>
@@ -4471,13 +4405,13 @@
       </p:sp>
       <p:sp>
         <p:nvSpPr>
-          <p:cNvPr id="94" name="Rectangle 93"/>
+          <p:cNvPr id="105" name="Rectangle 104"/>
           <p:cNvSpPr/>
           <p:nvPr/>
         </p:nvSpPr>
         <p:spPr>
           <a:xfrm>
-            <a:off x="4951546" y="3556691"/>
+            <a:off x="8132068" y="3556691"/>
             <a:ext cx="182880" cy="182880"/>
           </a:xfrm>
           <a:prstGeom prst="rect">
@@ -4514,13 +4448,1078 @@
       </p:sp>
       <p:sp>
         <p:nvSpPr>
-          <p:cNvPr id="105" name="Rectangle 104"/>
+          <p:cNvPr id="144" name="Rectangle 143"/>
           <p:cNvSpPr/>
           <p:nvPr/>
         </p:nvSpPr>
         <p:spPr>
           <a:xfrm>
-            <a:off x="8132068" y="3556691"/>
+            <a:off x="4331582" y="4404844"/>
+            <a:ext cx="182880" cy="182880"/>
+          </a:xfrm>
+          <a:prstGeom prst="rect">
+            <a:avLst/>
+          </a:prstGeom>
+          <a:solidFill>
+            <a:schemeClr val="bg2">
+              <a:lumMod val="50000"/>
+            </a:schemeClr>
+          </a:solidFill>
+        </p:spPr>
+        <p:style>
+          <a:lnRef idx="1">
+            <a:schemeClr val="accent1"/>
+          </a:lnRef>
+          <a:fillRef idx="3">
+            <a:schemeClr val="accent1"/>
+          </a:fillRef>
+          <a:effectRef idx="2">
+            <a:schemeClr val="accent1"/>
+          </a:effectRef>
+          <a:fontRef idx="minor">
+            <a:schemeClr val="lt1"/>
+          </a:fontRef>
+        </p:style>
+        <p:txBody>
+          <a:bodyPr rtlCol="0" anchor="ctr"/>
+          <a:lstStyle/>
+          <a:p>
+            <a:pPr algn="ctr"/>
+            <a:endParaRPr lang="en-US"/>
+          </a:p>
+        </p:txBody>
+      </p:sp>
+      <p:sp>
+        <p:nvSpPr>
+          <p:cNvPr id="146" name="Rectangle 145"/>
+          <p:cNvSpPr/>
+          <p:nvPr/>
+        </p:nvSpPr>
+        <p:spPr>
+          <a:xfrm>
+            <a:off x="4514462" y="4404844"/>
+            <a:ext cx="182880" cy="182880"/>
+          </a:xfrm>
+          <a:prstGeom prst="rect">
+            <a:avLst/>
+          </a:prstGeom>
+          <a:solidFill>
+            <a:schemeClr val="bg2">
+              <a:lumMod val="50000"/>
+            </a:schemeClr>
+          </a:solidFill>
+        </p:spPr>
+        <p:style>
+          <a:lnRef idx="1">
+            <a:schemeClr val="accent1"/>
+          </a:lnRef>
+          <a:fillRef idx="3">
+            <a:schemeClr val="accent1"/>
+          </a:fillRef>
+          <a:effectRef idx="2">
+            <a:schemeClr val="accent1"/>
+          </a:effectRef>
+          <a:fontRef idx="minor">
+            <a:schemeClr val="lt1"/>
+          </a:fontRef>
+        </p:style>
+        <p:txBody>
+          <a:bodyPr rtlCol="0" anchor="ctr"/>
+          <a:lstStyle/>
+          <a:p>
+            <a:pPr algn="ctr"/>
+            <a:endParaRPr lang="en-US"/>
+          </a:p>
+        </p:txBody>
+      </p:sp>
+      <p:sp>
+        <p:nvSpPr>
+          <p:cNvPr id="147" name="Rectangle 146"/>
+          <p:cNvSpPr/>
+          <p:nvPr/>
+        </p:nvSpPr>
+        <p:spPr>
+          <a:xfrm>
+            <a:off x="4331582" y="4587724"/>
+            <a:ext cx="182880" cy="182880"/>
+          </a:xfrm>
+          <a:prstGeom prst="rect">
+            <a:avLst/>
+          </a:prstGeom>
+          <a:solidFill>
+            <a:schemeClr val="bg2">
+              <a:lumMod val="50000"/>
+            </a:schemeClr>
+          </a:solidFill>
+        </p:spPr>
+        <p:style>
+          <a:lnRef idx="1">
+            <a:schemeClr val="accent1"/>
+          </a:lnRef>
+          <a:fillRef idx="3">
+            <a:schemeClr val="accent1"/>
+          </a:fillRef>
+          <a:effectRef idx="2">
+            <a:schemeClr val="accent1"/>
+          </a:effectRef>
+          <a:fontRef idx="minor">
+            <a:schemeClr val="lt1"/>
+          </a:fontRef>
+        </p:style>
+        <p:txBody>
+          <a:bodyPr rtlCol="0" anchor="ctr"/>
+          <a:lstStyle/>
+          <a:p>
+            <a:pPr algn="ctr"/>
+            <a:endParaRPr lang="en-US"/>
+          </a:p>
+        </p:txBody>
+      </p:sp>
+      <p:sp>
+        <p:nvSpPr>
+          <p:cNvPr id="148" name="Rectangle 147"/>
+          <p:cNvSpPr/>
+          <p:nvPr/>
+        </p:nvSpPr>
+        <p:spPr>
+          <a:xfrm>
+            <a:off x="4514462" y="4587724"/>
+            <a:ext cx="182880" cy="182880"/>
+          </a:xfrm>
+          <a:prstGeom prst="rect">
+            <a:avLst/>
+          </a:prstGeom>
+          <a:solidFill>
+            <a:schemeClr val="bg2">
+              <a:lumMod val="50000"/>
+            </a:schemeClr>
+          </a:solidFill>
+        </p:spPr>
+        <p:style>
+          <a:lnRef idx="1">
+            <a:schemeClr val="accent1"/>
+          </a:lnRef>
+          <a:fillRef idx="3">
+            <a:schemeClr val="accent1"/>
+          </a:fillRef>
+          <a:effectRef idx="2">
+            <a:schemeClr val="accent1"/>
+          </a:effectRef>
+          <a:fontRef idx="minor">
+            <a:schemeClr val="lt1"/>
+          </a:fontRef>
+        </p:style>
+        <p:txBody>
+          <a:bodyPr rtlCol="0" anchor="ctr"/>
+          <a:lstStyle/>
+          <a:p>
+            <a:pPr algn="ctr"/>
+            <a:endParaRPr lang="en-US"/>
+          </a:p>
+        </p:txBody>
+      </p:sp>
+      <p:sp>
+        <p:nvSpPr>
+          <p:cNvPr id="149" name="Rectangle 148"/>
+          <p:cNvSpPr/>
+          <p:nvPr/>
+        </p:nvSpPr>
+        <p:spPr>
+          <a:xfrm>
+            <a:off x="4331582" y="4862044"/>
+            <a:ext cx="182880" cy="182880"/>
+          </a:xfrm>
+          <a:prstGeom prst="rect">
+            <a:avLst/>
+          </a:prstGeom>
+          <a:solidFill>
+            <a:schemeClr val="accent4">
+              <a:lumMod val="75000"/>
+            </a:schemeClr>
+          </a:solidFill>
+        </p:spPr>
+        <p:style>
+          <a:lnRef idx="1">
+            <a:schemeClr val="accent1"/>
+          </a:lnRef>
+          <a:fillRef idx="3">
+            <a:schemeClr val="accent1"/>
+          </a:fillRef>
+          <a:effectRef idx="2">
+            <a:schemeClr val="accent1"/>
+          </a:effectRef>
+          <a:fontRef idx="minor">
+            <a:schemeClr val="lt1"/>
+          </a:fontRef>
+        </p:style>
+        <p:txBody>
+          <a:bodyPr rtlCol="0" anchor="ctr"/>
+          <a:lstStyle/>
+          <a:p>
+            <a:pPr algn="ctr"/>
+            <a:endParaRPr lang="en-US"/>
+          </a:p>
+        </p:txBody>
+      </p:sp>
+      <p:sp>
+        <p:nvSpPr>
+          <p:cNvPr id="150" name="Rectangle 149"/>
+          <p:cNvSpPr/>
+          <p:nvPr/>
+        </p:nvSpPr>
+        <p:spPr>
+          <a:xfrm>
+            <a:off x="4514462" y="4862044"/>
+            <a:ext cx="182880" cy="182880"/>
+          </a:xfrm>
+          <a:prstGeom prst="rect">
+            <a:avLst/>
+          </a:prstGeom>
+          <a:solidFill>
+            <a:schemeClr val="accent4">
+              <a:lumMod val="75000"/>
+            </a:schemeClr>
+          </a:solidFill>
+        </p:spPr>
+        <p:style>
+          <a:lnRef idx="1">
+            <a:schemeClr val="accent1"/>
+          </a:lnRef>
+          <a:fillRef idx="3">
+            <a:schemeClr val="accent1"/>
+          </a:fillRef>
+          <a:effectRef idx="2">
+            <a:schemeClr val="accent1"/>
+          </a:effectRef>
+          <a:fontRef idx="minor">
+            <a:schemeClr val="lt1"/>
+          </a:fontRef>
+        </p:style>
+        <p:txBody>
+          <a:bodyPr rtlCol="0" anchor="ctr"/>
+          <a:lstStyle/>
+          <a:p>
+            <a:pPr algn="ctr"/>
+            <a:endParaRPr lang="en-US"/>
+          </a:p>
+        </p:txBody>
+      </p:sp>
+      <p:sp>
+        <p:nvSpPr>
+          <p:cNvPr id="156" name="Rectangle 155"/>
+          <p:cNvSpPr/>
+          <p:nvPr/>
+        </p:nvSpPr>
+        <p:spPr>
+          <a:xfrm>
+            <a:off x="4971662" y="4404844"/>
+            <a:ext cx="182880" cy="182880"/>
+          </a:xfrm>
+          <a:prstGeom prst="rect">
+            <a:avLst/>
+          </a:prstGeom>
+          <a:solidFill>
+            <a:schemeClr val="accent5"/>
+          </a:solidFill>
+        </p:spPr>
+        <p:style>
+          <a:lnRef idx="1">
+            <a:schemeClr val="accent1"/>
+          </a:lnRef>
+          <a:fillRef idx="3">
+            <a:schemeClr val="accent1"/>
+          </a:fillRef>
+          <a:effectRef idx="2">
+            <a:schemeClr val="accent1"/>
+          </a:effectRef>
+          <a:fontRef idx="minor">
+            <a:schemeClr val="lt1"/>
+          </a:fontRef>
+        </p:style>
+        <p:txBody>
+          <a:bodyPr rtlCol="0" anchor="ctr"/>
+          <a:lstStyle/>
+          <a:p>
+            <a:pPr algn="ctr"/>
+            <a:endParaRPr lang="en-US"/>
+          </a:p>
+        </p:txBody>
+      </p:sp>
+      <p:sp>
+        <p:nvSpPr>
+          <p:cNvPr id="160" name="Down Arrow 159"/>
+          <p:cNvSpPr/>
+          <p:nvPr/>
+        </p:nvSpPr>
+        <p:spPr>
+          <a:xfrm>
+            <a:off x="4495585" y="3984528"/>
+            <a:ext cx="484632" cy="365760"/>
+          </a:xfrm>
+          <a:prstGeom prst="downArrow">
+            <a:avLst/>
+          </a:prstGeom>
+        </p:spPr>
+        <p:style>
+          <a:lnRef idx="1">
+            <a:schemeClr val="accent1"/>
+          </a:lnRef>
+          <a:fillRef idx="3">
+            <a:schemeClr val="accent1"/>
+          </a:fillRef>
+          <a:effectRef idx="2">
+            <a:schemeClr val="accent1"/>
+          </a:effectRef>
+          <a:fontRef idx="minor">
+            <a:schemeClr val="lt1"/>
+          </a:fontRef>
+        </p:style>
+        <p:txBody>
+          <a:bodyPr rtlCol="0" anchor="ctr"/>
+          <a:lstStyle/>
+          <a:p>
+            <a:pPr algn="ctr"/>
+            <a:endParaRPr lang="en-US"/>
+          </a:p>
+        </p:txBody>
+      </p:sp>
+      <p:sp>
+        <p:nvSpPr>
+          <p:cNvPr id="59" name="Rectangle 58"/>
+          <p:cNvSpPr/>
+          <p:nvPr/>
+        </p:nvSpPr>
+        <p:spPr>
+          <a:xfrm flipV="1">
+            <a:off x="987323" y="1645379"/>
+            <a:ext cx="1828800" cy="187261"/>
+          </a:xfrm>
+          <a:prstGeom prst="rect">
+            <a:avLst/>
+          </a:prstGeom>
+        </p:spPr>
+        <p:style>
+          <a:lnRef idx="1">
+            <a:schemeClr val="accent1"/>
+          </a:lnRef>
+          <a:fillRef idx="3">
+            <a:schemeClr val="accent1"/>
+          </a:fillRef>
+          <a:effectRef idx="2">
+            <a:schemeClr val="accent1"/>
+          </a:effectRef>
+          <a:fontRef idx="minor">
+            <a:schemeClr val="lt1"/>
+          </a:fontRef>
+        </p:style>
+        <p:txBody>
+          <a:bodyPr rtlCol="0" anchor="ctr"/>
+          <a:lstStyle/>
+          <a:p>
+            <a:pPr algn="ctr"/>
+            <a:endParaRPr lang="en-US" dirty="0" smtClean="0"/>
+          </a:p>
+          <a:p>
+            <a:pPr algn="ctr"/>
+            <a:endParaRPr dirty="0"/>
+          </a:p>
+          <a:p>
+            <a:pPr algn="ctr"/>
+            <a:endParaRPr lang="en-US" dirty="0" smtClean="0"/>
+          </a:p>
+          <a:p>
+            <a:pPr algn="ctr"/>
+            <a:endParaRPr lang="en-US" dirty="0"/>
+          </a:p>
+        </p:txBody>
+      </p:sp>
+      <p:sp>
+        <p:nvSpPr>
+          <p:cNvPr id="61" name="Rectangle 60"/>
+          <p:cNvSpPr/>
+          <p:nvPr/>
+        </p:nvSpPr>
+        <p:spPr>
+          <a:xfrm>
+            <a:off x="1691729" y="1645379"/>
+            <a:ext cx="182880" cy="182880"/>
+          </a:xfrm>
+          <a:prstGeom prst="rect">
+            <a:avLst/>
+          </a:prstGeom>
+          <a:solidFill>
+            <a:schemeClr val="tx1"/>
+          </a:solidFill>
+        </p:spPr>
+        <p:style>
+          <a:lnRef idx="1">
+            <a:schemeClr val="accent1"/>
+          </a:lnRef>
+          <a:fillRef idx="3">
+            <a:schemeClr val="accent1"/>
+          </a:fillRef>
+          <a:effectRef idx="2">
+            <a:schemeClr val="accent1"/>
+          </a:effectRef>
+          <a:fontRef idx="minor">
+            <a:schemeClr val="lt1"/>
+          </a:fontRef>
+        </p:style>
+        <p:txBody>
+          <a:bodyPr rtlCol="0" anchor="ctr"/>
+          <a:lstStyle/>
+          <a:p>
+            <a:pPr algn="ctr"/>
+            <a:endParaRPr lang="en-US"/>
+          </a:p>
+        </p:txBody>
+      </p:sp>
+      <p:sp>
+        <p:nvSpPr>
+          <p:cNvPr id="62" name="Rectangle 61"/>
+          <p:cNvSpPr/>
+          <p:nvPr/>
+        </p:nvSpPr>
+        <p:spPr>
+          <a:xfrm flipV="1">
+            <a:off x="2878915" y="1645379"/>
+            <a:ext cx="1828800" cy="187261"/>
+          </a:xfrm>
+          <a:prstGeom prst="rect">
+            <a:avLst/>
+          </a:prstGeom>
+        </p:spPr>
+        <p:style>
+          <a:lnRef idx="1">
+            <a:schemeClr val="accent1"/>
+          </a:lnRef>
+          <a:fillRef idx="3">
+            <a:schemeClr val="accent1"/>
+          </a:fillRef>
+          <a:effectRef idx="2">
+            <a:schemeClr val="accent1"/>
+          </a:effectRef>
+          <a:fontRef idx="minor">
+            <a:schemeClr val="lt1"/>
+          </a:fontRef>
+        </p:style>
+        <p:txBody>
+          <a:bodyPr rtlCol="0" anchor="ctr"/>
+          <a:lstStyle/>
+          <a:p>
+            <a:pPr algn="ctr"/>
+            <a:endParaRPr lang="en-US" dirty="0" smtClean="0"/>
+          </a:p>
+          <a:p>
+            <a:pPr algn="ctr"/>
+            <a:endParaRPr/>
+          </a:p>
+          <a:p>
+            <a:pPr algn="ctr"/>
+            <a:endParaRPr lang="en-US" dirty="0" smtClean="0"/>
+          </a:p>
+          <a:p>
+            <a:pPr algn="ctr"/>
+            <a:endParaRPr lang="en-US" dirty="0"/>
+          </a:p>
+        </p:txBody>
+      </p:sp>
+      <p:sp>
+        <p:nvSpPr>
+          <p:cNvPr id="63" name="Rectangle 62"/>
+          <p:cNvSpPr/>
+          <p:nvPr/>
+        </p:nvSpPr>
+        <p:spPr>
+          <a:xfrm flipV="1">
+            <a:off x="4772845" y="1645379"/>
+            <a:ext cx="1828800" cy="187261"/>
+          </a:xfrm>
+          <a:prstGeom prst="rect">
+            <a:avLst/>
+          </a:prstGeom>
+        </p:spPr>
+        <p:style>
+          <a:lnRef idx="1">
+            <a:schemeClr val="accent1"/>
+          </a:lnRef>
+          <a:fillRef idx="3">
+            <a:schemeClr val="accent1"/>
+          </a:fillRef>
+          <a:effectRef idx="2">
+            <a:schemeClr val="accent1"/>
+          </a:effectRef>
+          <a:fontRef idx="minor">
+            <a:schemeClr val="lt1"/>
+          </a:fontRef>
+        </p:style>
+        <p:txBody>
+          <a:bodyPr rtlCol="0" anchor="ctr"/>
+          <a:lstStyle/>
+          <a:p>
+            <a:pPr algn="ctr"/>
+            <a:endParaRPr lang="en-US" dirty="0" smtClean="0"/>
+          </a:p>
+          <a:p>
+            <a:pPr algn="ctr"/>
+            <a:endParaRPr/>
+          </a:p>
+          <a:p>
+            <a:pPr algn="ctr"/>
+            <a:endParaRPr lang="en-US" dirty="0" smtClean="0"/>
+          </a:p>
+          <a:p>
+            <a:pPr algn="ctr"/>
+            <a:endParaRPr lang="en-US" dirty="0"/>
+          </a:p>
+        </p:txBody>
+      </p:sp>
+      <p:sp>
+        <p:nvSpPr>
+          <p:cNvPr id="64" name="Rectangle 63"/>
+          <p:cNvSpPr/>
+          <p:nvPr/>
+        </p:nvSpPr>
+        <p:spPr>
+          <a:xfrm flipV="1">
+            <a:off x="6666775" y="1645379"/>
+            <a:ext cx="1828800" cy="187261"/>
+          </a:xfrm>
+          <a:prstGeom prst="rect">
+            <a:avLst/>
+          </a:prstGeom>
+        </p:spPr>
+        <p:style>
+          <a:lnRef idx="1">
+            <a:schemeClr val="accent1"/>
+          </a:lnRef>
+          <a:fillRef idx="3">
+            <a:schemeClr val="accent1"/>
+          </a:fillRef>
+          <a:effectRef idx="2">
+            <a:schemeClr val="accent1"/>
+          </a:effectRef>
+          <a:fontRef idx="minor">
+            <a:schemeClr val="lt1"/>
+          </a:fontRef>
+        </p:style>
+        <p:txBody>
+          <a:bodyPr rtlCol="0" anchor="ctr"/>
+          <a:lstStyle/>
+          <a:p>
+            <a:pPr algn="ctr"/>
+            <a:endParaRPr lang="en-US" dirty="0" smtClean="0"/>
+          </a:p>
+          <a:p>
+            <a:pPr algn="ctr"/>
+            <a:endParaRPr/>
+          </a:p>
+          <a:p>
+            <a:pPr algn="ctr"/>
+            <a:endParaRPr lang="en-US" dirty="0" smtClean="0"/>
+          </a:p>
+          <a:p>
+            <a:pPr algn="ctr"/>
+            <a:endParaRPr lang="en-US" dirty="0"/>
+          </a:p>
+        </p:txBody>
+      </p:sp>
+      <p:sp>
+        <p:nvSpPr>
+          <p:cNvPr id="65" name="Rectangle 64"/>
+          <p:cNvSpPr/>
+          <p:nvPr/>
+        </p:nvSpPr>
+        <p:spPr>
+          <a:xfrm>
+            <a:off x="8132068" y="1649760"/>
+            <a:ext cx="182880" cy="182880"/>
+          </a:xfrm>
+          <a:prstGeom prst="rect">
+            <a:avLst/>
+          </a:prstGeom>
+          <a:solidFill>
+            <a:schemeClr val="tx1"/>
+          </a:solidFill>
+        </p:spPr>
+        <p:style>
+          <a:lnRef idx="1">
+            <a:schemeClr val="accent1"/>
+          </a:lnRef>
+          <a:fillRef idx="3">
+            <a:schemeClr val="accent1"/>
+          </a:fillRef>
+          <a:effectRef idx="2">
+            <a:schemeClr val="accent1"/>
+          </a:effectRef>
+          <a:fontRef idx="minor">
+            <a:schemeClr val="lt1"/>
+          </a:fontRef>
+        </p:style>
+        <p:txBody>
+          <a:bodyPr rtlCol="0" anchor="ctr"/>
+          <a:lstStyle/>
+          <a:p>
+            <a:pPr algn="ctr"/>
+            <a:endParaRPr lang="en-US"/>
+          </a:p>
+        </p:txBody>
+      </p:sp>
+      <p:sp>
+        <p:nvSpPr>
+          <p:cNvPr id="66" name="Rectangle 65"/>
+          <p:cNvSpPr/>
+          <p:nvPr/>
+        </p:nvSpPr>
+        <p:spPr>
+          <a:xfrm>
+            <a:off x="3583813" y="1645379"/>
+            <a:ext cx="182880" cy="182880"/>
+          </a:xfrm>
+          <a:prstGeom prst="rect">
+            <a:avLst/>
+          </a:prstGeom>
+          <a:solidFill>
+            <a:schemeClr val="tx1"/>
+          </a:solidFill>
+        </p:spPr>
+        <p:style>
+          <a:lnRef idx="1">
+            <a:schemeClr val="accent1"/>
+          </a:lnRef>
+          <a:fillRef idx="3">
+            <a:schemeClr val="accent1"/>
+          </a:fillRef>
+          <a:effectRef idx="2">
+            <a:schemeClr val="accent1"/>
+          </a:effectRef>
+          <a:fontRef idx="minor">
+            <a:schemeClr val="lt1"/>
+          </a:fontRef>
+        </p:style>
+        <p:txBody>
+          <a:bodyPr rtlCol="0" anchor="ctr"/>
+          <a:lstStyle/>
+          <a:p>
+            <a:pPr algn="ctr"/>
+            <a:endParaRPr lang="en-US"/>
+          </a:p>
+        </p:txBody>
+      </p:sp>
+      <p:sp>
+        <p:nvSpPr>
+          <p:cNvPr id="67" name="Rectangle 66"/>
+          <p:cNvSpPr/>
+          <p:nvPr/>
+        </p:nvSpPr>
+        <p:spPr>
+          <a:xfrm>
+            <a:off x="4194422" y="1645379"/>
+            <a:ext cx="182880" cy="182880"/>
+          </a:xfrm>
+          <a:prstGeom prst="rect">
+            <a:avLst/>
+          </a:prstGeom>
+          <a:solidFill>
+            <a:schemeClr val="tx1"/>
+          </a:solidFill>
+        </p:spPr>
+        <p:style>
+          <a:lnRef idx="1">
+            <a:schemeClr val="accent1"/>
+          </a:lnRef>
+          <a:fillRef idx="3">
+            <a:schemeClr val="accent1"/>
+          </a:fillRef>
+          <a:effectRef idx="2">
+            <a:schemeClr val="accent1"/>
+          </a:effectRef>
+          <a:fontRef idx="minor">
+            <a:schemeClr val="lt1"/>
+          </a:fontRef>
+        </p:style>
+        <p:txBody>
+          <a:bodyPr rtlCol="0" anchor="ctr"/>
+          <a:lstStyle/>
+          <a:p>
+            <a:pPr algn="ctr"/>
+            <a:endParaRPr lang="en-US"/>
+          </a:p>
+        </p:txBody>
+      </p:sp>
+      <p:sp>
+        <p:nvSpPr>
+          <p:cNvPr id="69" name="Rectangle 68"/>
+          <p:cNvSpPr/>
+          <p:nvPr/>
+        </p:nvSpPr>
+        <p:spPr>
+          <a:xfrm rot="5400000" flipV="1">
+            <a:off x="278219" y="2354838"/>
+            <a:ext cx="365760" cy="187261"/>
+          </a:xfrm>
+          <a:prstGeom prst="rect">
+            <a:avLst/>
+          </a:prstGeom>
+        </p:spPr>
+        <p:style>
+          <a:lnRef idx="1">
+            <a:schemeClr val="accent1"/>
+          </a:lnRef>
+          <a:fillRef idx="3">
+            <a:schemeClr val="accent1"/>
+          </a:fillRef>
+          <a:effectRef idx="2">
+            <a:schemeClr val="accent1"/>
+          </a:effectRef>
+          <a:fontRef idx="minor">
+            <a:schemeClr val="lt1"/>
+          </a:fontRef>
+        </p:style>
+        <p:txBody>
+          <a:bodyPr rtlCol="0" anchor="ctr"/>
+          <a:lstStyle/>
+          <a:p>
+            <a:pPr algn="ctr"/>
+            <a:endParaRPr lang="en-US" dirty="0" smtClean="0"/>
+          </a:p>
+          <a:p>
+            <a:pPr algn="ctr"/>
+            <a:endParaRPr/>
+          </a:p>
+          <a:p>
+            <a:pPr algn="ctr"/>
+            <a:endParaRPr lang="en-US" dirty="0" smtClean="0"/>
+          </a:p>
+          <a:p>
+            <a:pPr algn="ctr"/>
+            <a:endParaRPr lang="en-US" dirty="0"/>
+          </a:p>
+        </p:txBody>
+      </p:sp>
+      <p:sp>
+        <p:nvSpPr>
+          <p:cNvPr id="70" name="Rectangle 69"/>
+          <p:cNvSpPr/>
+          <p:nvPr/>
+        </p:nvSpPr>
+        <p:spPr>
+          <a:xfrm rot="5400000" flipV="1">
+            <a:off x="278225" y="2785735"/>
+            <a:ext cx="365760" cy="187261"/>
+          </a:xfrm>
+          <a:prstGeom prst="rect">
+            <a:avLst/>
+          </a:prstGeom>
+        </p:spPr>
+        <p:style>
+          <a:lnRef idx="1">
+            <a:schemeClr val="accent1"/>
+          </a:lnRef>
+          <a:fillRef idx="3">
+            <a:schemeClr val="accent1"/>
+          </a:fillRef>
+          <a:effectRef idx="2">
+            <a:schemeClr val="accent1"/>
+          </a:effectRef>
+          <a:fontRef idx="minor">
+            <a:schemeClr val="lt1"/>
+          </a:fontRef>
+        </p:style>
+        <p:txBody>
+          <a:bodyPr rtlCol="0" anchor="ctr"/>
+          <a:lstStyle/>
+          <a:p>
+            <a:pPr algn="ctr"/>
+            <a:endParaRPr lang="en-US" dirty="0" smtClean="0"/>
+          </a:p>
+          <a:p>
+            <a:pPr algn="ctr"/>
+            <a:endParaRPr/>
+          </a:p>
+          <a:p>
+            <a:pPr algn="ctr"/>
+            <a:endParaRPr lang="en-US" dirty="0" smtClean="0"/>
+          </a:p>
+          <a:p>
+            <a:pPr algn="ctr"/>
+            <a:endParaRPr lang="en-US" dirty="0"/>
+          </a:p>
+        </p:txBody>
+      </p:sp>
+      <p:sp>
+        <p:nvSpPr>
+          <p:cNvPr id="79" name="Rectangle 78"/>
+          <p:cNvSpPr/>
+          <p:nvPr/>
+        </p:nvSpPr>
+        <p:spPr>
+          <a:xfrm rot="5400000" flipV="1">
+            <a:off x="278218" y="3216632"/>
+            <a:ext cx="365760" cy="187261"/>
+          </a:xfrm>
+          <a:prstGeom prst="rect">
+            <a:avLst/>
+          </a:prstGeom>
+        </p:spPr>
+        <p:style>
+          <a:lnRef idx="1">
+            <a:schemeClr val="accent1"/>
+          </a:lnRef>
+          <a:fillRef idx="3">
+            <a:schemeClr val="accent1"/>
+          </a:fillRef>
+          <a:effectRef idx="2">
+            <a:schemeClr val="accent1"/>
+          </a:effectRef>
+          <a:fontRef idx="minor">
+            <a:schemeClr val="lt1"/>
+          </a:fontRef>
+        </p:style>
+        <p:txBody>
+          <a:bodyPr rtlCol="0" anchor="ctr"/>
+          <a:lstStyle/>
+          <a:p>
+            <a:pPr algn="ctr"/>
+            <a:endParaRPr lang="en-US" dirty="0" smtClean="0"/>
+          </a:p>
+          <a:p>
+            <a:pPr algn="ctr"/>
+            <a:endParaRPr/>
+          </a:p>
+          <a:p>
+            <a:pPr algn="ctr"/>
+            <a:endParaRPr lang="en-US" dirty="0" smtClean="0"/>
+          </a:p>
+          <a:p>
+            <a:pPr algn="ctr"/>
+            <a:endParaRPr lang="en-US" dirty="0"/>
+          </a:p>
+        </p:txBody>
+      </p:sp>
+      <p:sp>
+        <p:nvSpPr>
+          <p:cNvPr id="80" name="Rectangle 79"/>
+          <p:cNvSpPr/>
+          <p:nvPr/>
+        </p:nvSpPr>
+        <p:spPr>
+          <a:xfrm rot="5400000" flipV="1">
+            <a:off x="278223" y="3647530"/>
+            <a:ext cx="365760" cy="187258"/>
+          </a:xfrm>
+          <a:prstGeom prst="rect">
+            <a:avLst/>
+          </a:prstGeom>
+        </p:spPr>
+        <p:style>
+          <a:lnRef idx="1">
+            <a:schemeClr val="accent1"/>
+          </a:lnRef>
+          <a:fillRef idx="3">
+            <a:schemeClr val="accent1"/>
+          </a:fillRef>
+          <a:effectRef idx="2">
+            <a:schemeClr val="accent1"/>
+          </a:effectRef>
+          <a:fontRef idx="minor">
+            <a:schemeClr val="lt1"/>
+          </a:fontRef>
+        </p:style>
+        <p:txBody>
+          <a:bodyPr rtlCol="0" anchor="ctr"/>
+          <a:lstStyle/>
+          <a:p>
+            <a:pPr algn="ctr"/>
+            <a:endParaRPr lang="en-US" dirty="0" smtClean="0"/>
+          </a:p>
+          <a:p>
+            <a:pPr algn="ctr"/>
+            <a:endParaRPr/>
+          </a:p>
+          <a:p>
+            <a:pPr algn="ctr"/>
+            <a:endParaRPr lang="en-US" dirty="0" smtClean="0"/>
+          </a:p>
+          <a:p>
+            <a:pPr algn="ctr"/>
+            <a:endParaRPr lang="en-US" dirty="0"/>
+          </a:p>
+        </p:txBody>
+      </p:sp>
+      <p:sp>
+        <p:nvSpPr>
+          <p:cNvPr id="81" name="Rectangle 80"/>
+          <p:cNvSpPr/>
+          <p:nvPr/>
+        </p:nvSpPr>
+        <p:spPr>
+          <a:xfrm>
+            <a:off x="367467" y="2448469"/>
+            <a:ext cx="182880" cy="182880"/>
+          </a:xfrm>
+          <a:prstGeom prst="rect">
+            <a:avLst/>
+          </a:prstGeom>
+          <a:solidFill>
+            <a:schemeClr val="tx1"/>
+          </a:solidFill>
+        </p:spPr>
+        <p:style>
+          <a:lnRef idx="1">
+            <a:schemeClr val="accent1"/>
+          </a:lnRef>
+          <a:fillRef idx="3">
+            <a:schemeClr val="accent1"/>
+          </a:fillRef>
+          <a:effectRef idx="2">
+            <a:schemeClr val="accent1"/>
+          </a:effectRef>
+          <a:fontRef idx="minor">
+            <a:schemeClr val="lt1"/>
+          </a:fontRef>
+        </p:style>
+        <p:txBody>
+          <a:bodyPr rtlCol="0" anchor="ctr"/>
+          <a:lstStyle/>
+          <a:p>
+            <a:pPr algn="ctr"/>
+            <a:endParaRPr lang="en-US"/>
+          </a:p>
+        </p:txBody>
+      </p:sp>
+      <p:sp>
+        <p:nvSpPr>
+          <p:cNvPr id="86" name="Rectangle 85"/>
+          <p:cNvSpPr/>
+          <p:nvPr/>
+        </p:nvSpPr>
+        <p:spPr>
+          <a:xfrm>
+            <a:off x="367474" y="2696485"/>
+            <a:ext cx="182880" cy="182880"/>
+          </a:xfrm>
+          <a:prstGeom prst="rect">
+            <a:avLst/>
+          </a:prstGeom>
+          <a:solidFill>
+            <a:schemeClr val="tx1"/>
+          </a:solidFill>
+        </p:spPr>
+        <p:style>
+          <a:lnRef idx="1">
+            <a:schemeClr val="accent1"/>
+          </a:lnRef>
+          <a:fillRef idx="3">
+            <a:schemeClr val="accent1"/>
+          </a:fillRef>
+          <a:effectRef idx="2">
+            <a:schemeClr val="accent1"/>
+          </a:effectRef>
+          <a:fontRef idx="minor">
+            <a:schemeClr val="lt1"/>
+          </a:fontRef>
+        </p:style>
+        <p:txBody>
+          <a:bodyPr rtlCol="0" anchor="ctr"/>
+          <a:lstStyle/>
+          <a:p>
+            <a:pPr algn="ctr"/>
+            <a:endParaRPr lang="en-US"/>
+          </a:p>
+        </p:txBody>
+      </p:sp>
+      <p:sp>
+        <p:nvSpPr>
+          <p:cNvPr id="87" name="Rectangle 86"/>
+          <p:cNvSpPr/>
+          <p:nvPr/>
+        </p:nvSpPr>
+        <p:spPr>
+          <a:xfrm>
+            <a:off x="367467" y="3558279"/>
+            <a:ext cx="182880" cy="182880"/>
+          </a:xfrm>
+          <a:prstGeom prst="rect">
+            <a:avLst/>
+          </a:prstGeom>
+          <a:solidFill>
+            <a:schemeClr val="tx1"/>
+          </a:solidFill>
+        </p:spPr>
+        <p:style>
+          <a:lnRef idx="1">
+            <a:schemeClr val="accent1"/>
+          </a:lnRef>
+          <a:fillRef idx="3">
+            <a:schemeClr val="accent1"/>
+          </a:fillRef>
+          <a:effectRef idx="2">
+            <a:schemeClr val="accent1"/>
+          </a:effectRef>
+          <a:fontRef idx="minor">
+            <a:schemeClr val="lt1"/>
+          </a:fontRef>
+        </p:style>
+        <p:txBody>
+          <a:bodyPr rtlCol="0" anchor="ctr"/>
+          <a:lstStyle/>
+          <a:p>
+            <a:pPr algn="ctr"/>
+            <a:endParaRPr lang="en-US"/>
+          </a:p>
+        </p:txBody>
+      </p:sp>
+      <p:sp>
+        <p:nvSpPr>
+          <p:cNvPr id="154" name="Rectangle 153"/>
+          <p:cNvSpPr/>
+          <p:nvPr/>
+        </p:nvSpPr>
+        <p:spPr>
+          <a:xfrm>
+            <a:off x="4971662" y="4587724"/>
+            <a:ext cx="182880" cy="182880"/>
+          </a:xfrm>
+          <a:prstGeom prst="rect">
+            <a:avLst/>
+          </a:prstGeom>
+          <a:solidFill>
+            <a:schemeClr val="accent5"/>
+          </a:solidFill>
+        </p:spPr>
+        <p:style>
+          <a:lnRef idx="1">
+            <a:schemeClr val="accent1"/>
+          </a:lnRef>
+          <a:fillRef idx="3">
+            <a:schemeClr val="accent1"/>
+          </a:fillRef>
+          <a:effectRef idx="2">
+            <a:schemeClr val="accent1"/>
+          </a:effectRef>
+          <a:fontRef idx="minor">
+            <a:schemeClr val="lt1"/>
+          </a:fontRef>
+        </p:style>
+        <p:txBody>
+          <a:bodyPr rtlCol="0" anchor="ctr"/>
+          <a:lstStyle/>
+          <a:p>
+            <a:pPr algn="ctr"/>
+            <a:endParaRPr lang="en-US"/>
+          </a:p>
+        </p:txBody>
+      </p:sp>
+      <p:sp>
+        <p:nvSpPr>
+          <p:cNvPr id="152" name="Rectangle 151"/>
+          <p:cNvSpPr/>
+          <p:nvPr/>
+        </p:nvSpPr>
+        <p:spPr>
+          <a:xfrm>
+            <a:off x="4971662" y="4862044"/>
             <a:ext cx="182880" cy="182880"/>
           </a:xfrm>
           <a:prstGeom prst="rect">
@@ -4555,295 +5554,15 @@
           </a:p>
         </p:txBody>
       </p:sp>
-      <p:cxnSp>
-        <p:nvCxnSpPr>
-          <p:cNvPr id="109" name="Straight Arrow Connector 108"/>
-          <p:cNvCxnSpPr>
-            <a:stCxn id="29" idx="2"/>
-          </p:cNvCxnSpPr>
-          <p:nvPr/>
-        </p:nvCxnSpPr>
-        <p:spPr>
-          <a:xfrm rot="16200000" flipH="1">
-            <a:off x="1011436" y="2196673"/>
-            <a:ext cx="134655" cy="1"/>
-          </a:xfrm>
-          <a:prstGeom prst="straightConnector1">
-            <a:avLst/>
-          </a:prstGeom>
-          <a:ln>
-            <a:tailEnd type="arrow"/>
-          </a:ln>
-        </p:spPr>
-        <p:style>
-          <a:lnRef idx="2">
-            <a:schemeClr val="accent1"/>
-          </a:lnRef>
-          <a:fillRef idx="0">
-            <a:schemeClr val="accent1"/>
-          </a:fillRef>
-          <a:effectRef idx="1">
-            <a:schemeClr val="accent1"/>
-          </a:effectRef>
-          <a:fontRef idx="minor">
-            <a:schemeClr val="tx1"/>
-          </a:fontRef>
-        </p:style>
-      </p:cxnSp>
-      <p:cxnSp>
-        <p:nvCxnSpPr>
-          <p:cNvPr id="121" name="Straight Arrow Connector 120"/>
-          <p:cNvCxnSpPr>
-            <a:stCxn id="29" idx="2"/>
-          </p:cNvCxnSpPr>
-          <p:nvPr/>
-        </p:nvCxnSpPr>
-        <p:spPr>
-          <a:xfrm rot="16200000" flipH="1">
-            <a:off x="578969" y="2629140"/>
-            <a:ext cx="999588" cy="1"/>
-          </a:xfrm>
-          <a:prstGeom prst="straightConnector1">
-            <a:avLst/>
-          </a:prstGeom>
-          <a:ln>
-            <a:tailEnd type="arrow"/>
-          </a:ln>
-        </p:spPr>
-        <p:style>
-          <a:lnRef idx="2">
-            <a:schemeClr val="accent1"/>
-          </a:lnRef>
-          <a:fillRef idx="0">
-            <a:schemeClr val="accent1"/>
-          </a:fillRef>
-          <a:effectRef idx="1">
-            <a:schemeClr val="accent1"/>
-          </a:effectRef>
-          <a:fontRef idx="minor">
-            <a:schemeClr val="tx1"/>
-          </a:fontRef>
-        </p:style>
-      </p:cxnSp>
-      <p:cxnSp>
-        <p:nvCxnSpPr>
-          <p:cNvPr id="124" name="Straight Arrow Connector 123"/>
-          <p:cNvCxnSpPr>
-            <a:stCxn id="57" idx="2"/>
-          </p:cNvCxnSpPr>
-          <p:nvPr/>
-        </p:nvCxnSpPr>
-        <p:spPr>
-          <a:xfrm rot="5400000">
-            <a:off x="4781924" y="2196674"/>
-            <a:ext cx="134654" cy="1"/>
-          </a:xfrm>
-          <a:prstGeom prst="straightConnector1">
-            <a:avLst/>
-          </a:prstGeom>
-          <a:ln>
-            <a:tailEnd type="arrow"/>
-          </a:ln>
-        </p:spPr>
-        <p:style>
-          <a:lnRef idx="2">
-            <a:schemeClr val="accent1"/>
-          </a:lnRef>
-          <a:fillRef idx="0">
-            <a:schemeClr val="accent1"/>
-          </a:fillRef>
-          <a:effectRef idx="1">
-            <a:schemeClr val="accent1"/>
-          </a:effectRef>
-          <a:fontRef idx="minor">
-            <a:schemeClr val="tx1"/>
-          </a:fontRef>
-        </p:style>
-      </p:cxnSp>
-      <p:cxnSp>
-        <p:nvCxnSpPr>
-          <p:cNvPr id="125" name="Straight Arrow Connector 124"/>
-          <p:cNvCxnSpPr>
-            <a:stCxn id="57" idx="2"/>
-          </p:cNvCxnSpPr>
-          <p:nvPr/>
-        </p:nvCxnSpPr>
-        <p:spPr>
-          <a:xfrm rot="16200000" flipH="1">
-            <a:off x="4349456" y="2629141"/>
-            <a:ext cx="999590" cy="1"/>
-          </a:xfrm>
-          <a:prstGeom prst="straightConnector1">
-            <a:avLst/>
-          </a:prstGeom>
-          <a:ln>
-            <a:tailEnd type="arrow"/>
-          </a:ln>
-        </p:spPr>
-        <p:style>
-          <a:lnRef idx="2">
-            <a:schemeClr val="accent1"/>
-          </a:lnRef>
-          <a:fillRef idx="0">
-            <a:schemeClr val="accent1"/>
-          </a:fillRef>
-          <a:effectRef idx="1">
-            <a:schemeClr val="accent1"/>
-          </a:effectRef>
-          <a:fontRef idx="minor">
-            <a:schemeClr val="tx1"/>
-          </a:fontRef>
-        </p:style>
-      </p:cxnSp>
-      <p:cxnSp>
-        <p:nvCxnSpPr>
-          <p:cNvPr id="133" name="Straight Arrow Connector 132"/>
-          <p:cNvCxnSpPr>
-            <a:stCxn id="49" idx="3"/>
-          </p:cNvCxnSpPr>
-          <p:nvPr/>
-        </p:nvCxnSpPr>
-        <p:spPr>
-          <a:xfrm>
-            <a:off x="852686" y="2355440"/>
-            <a:ext cx="134636" cy="1588"/>
-          </a:xfrm>
-          <a:prstGeom prst="straightConnector1">
-            <a:avLst/>
-          </a:prstGeom>
-          <a:ln>
-            <a:tailEnd type="arrow"/>
-          </a:ln>
-        </p:spPr>
-        <p:style>
-          <a:lnRef idx="2">
-            <a:schemeClr val="accent1"/>
-          </a:lnRef>
-          <a:fillRef idx="0">
-            <a:schemeClr val="accent1"/>
-          </a:fillRef>
-          <a:effectRef idx="1">
-            <a:schemeClr val="accent1"/>
-          </a:effectRef>
-          <a:fontRef idx="minor">
-            <a:schemeClr val="tx1"/>
-          </a:fontRef>
-        </p:style>
-      </p:cxnSp>
-      <p:cxnSp>
-        <p:nvCxnSpPr>
-          <p:cNvPr id="136" name="Straight Arrow Connector 135"/>
-          <p:cNvCxnSpPr>
-            <a:stCxn id="49" idx="3"/>
-          </p:cNvCxnSpPr>
-          <p:nvPr/>
-        </p:nvCxnSpPr>
-        <p:spPr>
-          <a:xfrm>
-            <a:off x="852686" y="2355440"/>
-            <a:ext cx="3905125" cy="1588"/>
-          </a:xfrm>
-          <a:prstGeom prst="straightConnector1">
-            <a:avLst/>
-          </a:prstGeom>
-          <a:ln>
-            <a:tailEnd type="arrow"/>
-          </a:ln>
-        </p:spPr>
-        <p:style>
-          <a:lnRef idx="2">
-            <a:schemeClr val="accent1"/>
-          </a:lnRef>
-          <a:fillRef idx="0">
-            <a:schemeClr val="accent1"/>
-          </a:fillRef>
-          <a:effectRef idx="1">
-            <a:schemeClr val="accent1"/>
-          </a:effectRef>
-          <a:fontRef idx="minor">
-            <a:schemeClr val="tx1"/>
-          </a:fontRef>
-        </p:style>
-      </p:cxnSp>
-      <p:cxnSp>
-        <p:nvCxnSpPr>
-          <p:cNvPr id="139" name="Straight Arrow Connector 138"/>
-          <p:cNvCxnSpPr>
-            <a:stCxn id="58" idx="3"/>
-          </p:cNvCxnSpPr>
-          <p:nvPr/>
-        </p:nvCxnSpPr>
-        <p:spPr>
-          <a:xfrm>
-            <a:off x="852686" y="3217234"/>
-            <a:ext cx="3922496" cy="1588"/>
-          </a:xfrm>
-          <a:prstGeom prst="straightConnector1">
-            <a:avLst/>
-          </a:prstGeom>
-          <a:ln>
-            <a:tailEnd type="arrow"/>
-          </a:ln>
-        </p:spPr>
-        <p:style>
-          <a:lnRef idx="2">
-            <a:schemeClr val="accent1"/>
-          </a:lnRef>
-          <a:fillRef idx="0">
-            <a:schemeClr val="accent1"/>
-          </a:fillRef>
-          <a:effectRef idx="1">
-            <a:schemeClr val="accent1"/>
-          </a:effectRef>
-          <a:fontRef idx="minor">
-            <a:schemeClr val="tx1"/>
-          </a:fontRef>
-        </p:style>
-      </p:cxnSp>
-      <p:cxnSp>
-        <p:nvCxnSpPr>
-          <p:cNvPr id="143" name="Straight Arrow Connector 142"/>
-          <p:cNvCxnSpPr>
-            <a:stCxn id="58" idx="3"/>
-          </p:cNvCxnSpPr>
-          <p:nvPr/>
-        </p:nvCxnSpPr>
-        <p:spPr>
-          <a:xfrm>
-            <a:off x="852686" y="3217234"/>
-            <a:ext cx="134637" cy="1588"/>
-          </a:xfrm>
-          <a:prstGeom prst="straightConnector1">
-            <a:avLst/>
-          </a:prstGeom>
-          <a:ln>
-            <a:tailEnd type="arrow"/>
-          </a:ln>
-        </p:spPr>
-        <p:style>
-          <a:lnRef idx="2">
-            <a:schemeClr val="accent1"/>
-          </a:lnRef>
-          <a:fillRef idx="0">
-            <a:schemeClr val="accent1"/>
-          </a:fillRef>
-          <a:effectRef idx="1">
-            <a:schemeClr val="accent1"/>
-          </a:effectRef>
-          <a:fontRef idx="minor">
-            <a:schemeClr val="tx1"/>
-          </a:fontRef>
-        </p:style>
-      </p:cxnSp>
-      <p:sp>
-        <p:nvSpPr>
-          <p:cNvPr id="144" name="Rectangle 143"/>
+      <p:sp>
+        <p:nvSpPr>
+          <p:cNvPr id="68" name="Rectangle 67"/>
           <p:cNvSpPr/>
           <p:nvPr/>
         </p:nvSpPr>
         <p:spPr>
           <a:xfrm>
-            <a:off x="4377302" y="4404844"/>
+            <a:off x="4194422" y="2448469"/>
             <a:ext cx="182880" cy="182880"/>
           </a:xfrm>
           <a:prstGeom prst="rect">
@@ -4880,13 +5599,13 @@
       </p:sp>
       <p:sp>
         <p:nvSpPr>
-          <p:cNvPr id="146" name="Rectangle 145"/>
+          <p:cNvPr id="71" name="Rectangle 70"/>
           <p:cNvSpPr/>
           <p:nvPr/>
         </p:nvSpPr>
         <p:spPr>
           <a:xfrm>
-            <a:off x="4560182" y="4404844"/>
+            <a:off x="4194422" y="2696485"/>
             <a:ext cx="182880" cy="182880"/>
           </a:xfrm>
           <a:prstGeom prst="rect">
@@ -4923,13 +5642,56 @@
       </p:sp>
       <p:sp>
         <p:nvSpPr>
-          <p:cNvPr id="147" name="Rectangle 146"/>
+          <p:cNvPr id="75" name="Rectangle 74"/>
           <p:cNvSpPr/>
           <p:nvPr/>
         </p:nvSpPr>
         <p:spPr>
           <a:xfrm>
-            <a:off x="4377302" y="4587724"/>
+            <a:off x="4194422" y="3558279"/>
+            <a:ext cx="182880" cy="182880"/>
+          </a:xfrm>
+          <a:prstGeom prst="rect">
+            <a:avLst/>
+          </a:prstGeom>
+          <a:solidFill>
+            <a:schemeClr val="accent4">
+              <a:lumMod val="75000"/>
+            </a:schemeClr>
+          </a:solidFill>
+        </p:spPr>
+        <p:style>
+          <a:lnRef idx="1">
+            <a:schemeClr val="accent1"/>
+          </a:lnRef>
+          <a:fillRef idx="3">
+            <a:schemeClr val="accent1"/>
+          </a:fillRef>
+          <a:effectRef idx="2">
+            <a:schemeClr val="accent1"/>
+          </a:effectRef>
+          <a:fontRef idx="minor">
+            <a:schemeClr val="lt1"/>
+          </a:fontRef>
+        </p:style>
+        <p:txBody>
+          <a:bodyPr rtlCol="0" anchor="ctr"/>
+          <a:lstStyle/>
+          <a:p>
+            <a:pPr algn="ctr"/>
+            <a:endParaRPr lang="en-US"/>
+          </a:p>
+        </p:txBody>
+      </p:sp>
+      <p:sp>
+        <p:nvSpPr>
+          <p:cNvPr id="76" name="Rectangle 75"/>
+          <p:cNvSpPr/>
+          <p:nvPr/>
+        </p:nvSpPr>
+        <p:spPr>
+          <a:xfrm>
+            <a:off x="4788782" y="4404844"/>
             <a:ext cx="182880" cy="182880"/>
           </a:xfrm>
           <a:prstGeom prst="rect">
@@ -4966,13 +5728,13 @@
       </p:sp>
       <p:sp>
         <p:nvSpPr>
-          <p:cNvPr id="148" name="Rectangle 147"/>
+          <p:cNvPr id="85" name="Rectangle 84"/>
           <p:cNvSpPr/>
           <p:nvPr/>
         </p:nvSpPr>
         <p:spPr>
           <a:xfrm>
-            <a:off x="4560182" y="4587724"/>
+            <a:off x="4788782" y="4587724"/>
             <a:ext cx="182880" cy="182880"/>
           </a:xfrm>
           <a:prstGeom prst="rect">
@@ -5009,13 +5771,13 @@
       </p:sp>
       <p:sp>
         <p:nvSpPr>
-          <p:cNvPr id="149" name="Rectangle 148"/>
+          <p:cNvPr id="88" name="Rectangle 87"/>
           <p:cNvSpPr/>
           <p:nvPr/>
         </p:nvSpPr>
         <p:spPr>
           <a:xfrm>
-            <a:off x="4377302" y="4770604"/>
+            <a:off x="4788782" y="4862044"/>
             <a:ext cx="182880" cy="182880"/>
           </a:xfrm>
           <a:prstGeom prst="rect">
@@ -5024,1024 +5786,6 @@
           <a:solidFill>
             <a:schemeClr val="accent4">
               <a:lumMod val="75000"/>
-            </a:schemeClr>
-          </a:solidFill>
-        </p:spPr>
-        <p:style>
-          <a:lnRef idx="1">
-            <a:schemeClr val="accent1"/>
-          </a:lnRef>
-          <a:fillRef idx="3">
-            <a:schemeClr val="accent1"/>
-          </a:fillRef>
-          <a:effectRef idx="2">
-            <a:schemeClr val="accent1"/>
-          </a:effectRef>
-          <a:fontRef idx="minor">
-            <a:schemeClr val="lt1"/>
-          </a:fontRef>
-        </p:style>
-        <p:txBody>
-          <a:bodyPr rtlCol="0" anchor="ctr"/>
-          <a:lstStyle/>
-          <a:p>
-            <a:pPr algn="ctr"/>
-            <a:endParaRPr lang="en-US"/>
-          </a:p>
-        </p:txBody>
-      </p:sp>
-      <p:sp>
-        <p:nvSpPr>
-          <p:cNvPr id="150" name="Rectangle 149"/>
-          <p:cNvSpPr/>
-          <p:nvPr/>
-        </p:nvSpPr>
-        <p:spPr>
-          <a:xfrm>
-            <a:off x="4560182" y="4770604"/>
-            <a:ext cx="182880" cy="182880"/>
-          </a:xfrm>
-          <a:prstGeom prst="rect">
-            <a:avLst/>
-          </a:prstGeom>
-          <a:solidFill>
-            <a:schemeClr val="accent4">
-              <a:lumMod val="75000"/>
-            </a:schemeClr>
-          </a:solidFill>
-        </p:spPr>
-        <p:style>
-          <a:lnRef idx="1">
-            <a:schemeClr val="accent1"/>
-          </a:lnRef>
-          <a:fillRef idx="3">
-            <a:schemeClr val="accent1"/>
-          </a:fillRef>
-          <a:effectRef idx="2">
-            <a:schemeClr val="accent1"/>
-          </a:effectRef>
-          <a:fontRef idx="minor">
-            <a:schemeClr val="lt1"/>
-          </a:fontRef>
-        </p:style>
-        <p:txBody>
-          <a:bodyPr rtlCol="0" anchor="ctr"/>
-          <a:lstStyle/>
-          <a:p>
-            <a:pPr algn="ctr"/>
-            <a:endParaRPr lang="en-US"/>
-          </a:p>
-        </p:txBody>
-      </p:sp>
-      <p:sp>
-        <p:nvSpPr>
-          <p:cNvPr id="155" name="Rectangle 154"/>
-          <p:cNvSpPr/>
-          <p:nvPr/>
-        </p:nvSpPr>
-        <p:spPr>
-          <a:xfrm>
-            <a:off x="4743062" y="4404844"/>
-            <a:ext cx="182880" cy="182880"/>
-          </a:xfrm>
-          <a:prstGeom prst="rect">
-            <a:avLst/>
-          </a:prstGeom>
-          <a:solidFill>
-            <a:schemeClr val="accent5"/>
-          </a:solidFill>
-        </p:spPr>
-        <p:style>
-          <a:lnRef idx="1">
-            <a:schemeClr val="accent1"/>
-          </a:lnRef>
-          <a:fillRef idx="3">
-            <a:schemeClr val="accent1"/>
-          </a:fillRef>
-          <a:effectRef idx="2">
-            <a:schemeClr val="accent1"/>
-          </a:effectRef>
-          <a:fontRef idx="minor">
-            <a:schemeClr val="lt1"/>
-          </a:fontRef>
-        </p:style>
-        <p:txBody>
-          <a:bodyPr rtlCol="0" anchor="ctr"/>
-          <a:lstStyle/>
-          <a:p>
-            <a:pPr algn="ctr"/>
-            <a:endParaRPr lang="en-US"/>
-          </a:p>
-        </p:txBody>
-      </p:sp>
-      <p:sp>
-        <p:nvSpPr>
-          <p:cNvPr id="156" name="Rectangle 155"/>
-          <p:cNvSpPr/>
-          <p:nvPr/>
-        </p:nvSpPr>
-        <p:spPr>
-          <a:xfrm>
-            <a:off x="4925942" y="4404844"/>
-            <a:ext cx="182880" cy="182880"/>
-          </a:xfrm>
-          <a:prstGeom prst="rect">
-            <a:avLst/>
-          </a:prstGeom>
-          <a:solidFill>
-            <a:schemeClr val="accent5"/>
-          </a:solidFill>
-        </p:spPr>
-        <p:style>
-          <a:lnRef idx="1">
-            <a:schemeClr val="accent1"/>
-          </a:lnRef>
-          <a:fillRef idx="3">
-            <a:schemeClr val="accent1"/>
-          </a:fillRef>
-          <a:effectRef idx="2">
-            <a:schemeClr val="accent1"/>
-          </a:effectRef>
-          <a:fontRef idx="minor">
-            <a:schemeClr val="lt1"/>
-          </a:fontRef>
-        </p:style>
-        <p:txBody>
-          <a:bodyPr rtlCol="0" anchor="ctr"/>
-          <a:lstStyle/>
-          <a:p>
-            <a:pPr algn="ctr"/>
-            <a:endParaRPr lang="en-US"/>
-          </a:p>
-        </p:txBody>
-      </p:sp>
-      <p:sp>
-        <p:nvSpPr>
-          <p:cNvPr id="160" name="Down Arrow 159"/>
-          <p:cNvSpPr/>
-          <p:nvPr/>
-        </p:nvSpPr>
-        <p:spPr>
-          <a:xfrm>
-            <a:off x="4495585" y="3984528"/>
-            <a:ext cx="484632" cy="365760"/>
-          </a:xfrm>
-          <a:prstGeom prst="downArrow">
-            <a:avLst/>
-          </a:prstGeom>
-        </p:spPr>
-        <p:style>
-          <a:lnRef idx="1">
-            <a:schemeClr val="accent1"/>
-          </a:lnRef>
-          <a:fillRef idx="3">
-            <a:schemeClr val="accent1"/>
-          </a:fillRef>
-          <a:effectRef idx="2">
-            <a:schemeClr val="accent1"/>
-          </a:effectRef>
-          <a:fontRef idx="minor">
-            <a:schemeClr val="lt1"/>
-          </a:fontRef>
-        </p:style>
-        <p:txBody>
-          <a:bodyPr rtlCol="0" anchor="ctr"/>
-          <a:lstStyle/>
-          <a:p>
-            <a:pPr algn="ctr"/>
-            <a:endParaRPr lang="en-US"/>
-          </a:p>
-        </p:txBody>
-      </p:sp>
-      <p:sp>
-        <p:nvSpPr>
-          <p:cNvPr id="59" name="Rectangle 58"/>
-          <p:cNvSpPr/>
-          <p:nvPr/>
-        </p:nvSpPr>
-        <p:spPr>
-          <a:xfrm flipV="1">
-            <a:off x="987323" y="1645379"/>
-            <a:ext cx="1828800" cy="187261"/>
-          </a:xfrm>
-          <a:prstGeom prst="rect">
-            <a:avLst/>
-          </a:prstGeom>
-        </p:spPr>
-        <p:style>
-          <a:lnRef idx="1">
-            <a:schemeClr val="accent1"/>
-          </a:lnRef>
-          <a:fillRef idx="3">
-            <a:schemeClr val="accent1"/>
-          </a:fillRef>
-          <a:effectRef idx="2">
-            <a:schemeClr val="accent1"/>
-          </a:effectRef>
-          <a:fontRef idx="minor">
-            <a:schemeClr val="lt1"/>
-          </a:fontRef>
-        </p:style>
-        <p:txBody>
-          <a:bodyPr rtlCol="0" anchor="ctr"/>
-          <a:lstStyle/>
-          <a:p>
-            <a:pPr algn="ctr"/>
-            <a:endParaRPr lang="en-US" dirty="0" smtClean="0"/>
-          </a:p>
-          <a:p>
-            <a:pPr algn="ctr"/>
-            <a:endParaRPr dirty="0"/>
-          </a:p>
-          <a:p>
-            <a:pPr algn="ctr"/>
-            <a:endParaRPr lang="en-US" dirty="0" smtClean="0"/>
-          </a:p>
-          <a:p>
-            <a:pPr algn="ctr"/>
-            <a:endParaRPr lang="en-US" dirty="0"/>
-          </a:p>
-        </p:txBody>
-      </p:sp>
-      <p:sp>
-        <p:nvSpPr>
-          <p:cNvPr id="61" name="Rectangle 60"/>
-          <p:cNvSpPr/>
-          <p:nvPr/>
-        </p:nvSpPr>
-        <p:spPr>
-          <a:xfrm>
-            <a:off x="1691729" y="1645379"/>
-            <a:ext cx="182880" cy="182880"/>
-          </a:xfrm>
-          <a:prstGeom prst="rect">
-            <a:avLst/>
-          </a:prstGeom>
-          <a:solidFill>
-            <a:schemeClr val="tx1"/>
-          </a:solidFill>
-        </p:spPr>
-        <p:style>
-          <a:lnRef idx="1">
-            <a:schemeClr val="accent1"/>
-          </a:lnRef>
-          <a:fillRef idx="3">
-            <a:schemeClr val="accent1"/>
-          </a:fillRef>
-          <a:effectRef idx="2">
-            <a:schemeClr val="accent1"/>
-          </a:effectRef>
-          <a:fontRef idx="minor">
-            <a:schemeClr val="lt1"/>
-          </a:fontRef>
-        </p:style>
-        <p:txBody>
-          <a:bodyPr rtlCol="0" anchor="ctr"/>
-          <a:lstStyle/>
-          <a:p>
-            <a:pPr algn="ctr"/>
-            <a:endParaRPr lang="en-US"/>
-          </a:p>
-        </p:txBody>
-      </p:sp>
-      <p:sp>
-        <p:nvSpPr>
-          <p:cNvPr id="62" name="Rectangle 61"/>
-          <p:cNvSpPr/>
-          <p:nvPr/>
-        </p:nvSpPr>
-        <p:spPr>
-          <a:xfrm flipV="1">
-            <a:off x="2878915" y="1645379"/>
-            <a:ext cx="1828800" cy="187261"/>
-          </a:xfrm>
-          <a:prstGeom prst="rect">
-            <a:avLst/>
-          </a:prstGeom>
-        </p:spPr>
-        <p:style>
-          <a:lnRef idx="1">
-            <a:schemeClr val="accent1"/>
-          </a:lnRef>
-          <a:fillRef idx="3">
-            <a:schemeClr val="accent1"/>
-          </a:fillRef>
-          <a:effectRef idx="2">
-            <a:schemeClr val="accent1"/>
-          </a:effectRef>
-          <a:fontRef idx="minor">
-            <a:schemeClr val="lt1"/>
-          </a:fontRef>
-        </p:style>
-        <p:txBody>
-          <a:bodyPr rtlCol="0" anchor="ctr"/>
-          <a:lstStyle/>
-          <a:p>
-            <a:pPr algn="ctr"/>
-            <a:endParaRPr lang="en-US" dirty="0" smtClean="0"/>
-          </a:p>
-          <a:p>
-            <a:pPr algn="ctr"/>
-            <a:endParaRPr/>
-          </a:p>
-          <a:p>
-            <a:pPr algn="ctr"/>
-            <a:endParaRPr lang="en-US" dirty="0" smtClean="0"/>
-          </a:p>
-          <a:p>
-            <a:pPr algn="ctr"/>
-            <a:endParaRPr lang="en-US" dirty="0"/>
-          </a:p>
-        </p:txBody>
-      </p:sp>
-      <p:sp>
-        <p:nvSpPr>
-          <p:cNvPr id="63" name="Rectangle 62"/>
-          <p:cNvSpPr/>
-          <p:nvPr/>
-        </p:nvSpPr>
-        <p:spPr>
-          <a:xfrm flipV="1">
-            <a:off x="4772845" y="1645379"/>
-            <a:ext cx="1828800" cy="187261"/>
-          </a:xfrm>
-          <a:prstGeom prst="rect">
-            <a:avLst/>
-          </a:prstGeom>
-        </p:spPr>
-        <p:style>
-          <a:lnRef idx="1">
-            <a:schemeClr val="accent1"/>
-          </a:lnRef>
-          <a:fillRef idx="3">
-            <a:schemeClr val="accent1"/>
-          </a:fillRef>
-          <a:effectRef idx="2">
-            <a:schemeClr val="accent1"/>
-          </a:effectRef>
-          <a:fontRef idx="minor">
-            <a:schemeClr val="lt1"/>
-          </a:fontRef>
-        </p:style>
-        <p:txBody>
-          <a:bodyPr rtlCol="0" anchor="ctr"/>
-          <a:lstStyle/>
-          <a:p>
-            <a:pPr algn="ctr"/>
-            <a:endParaRPr lang="en-US" dirty="0" smtClean="0"/>
-          </a:p>
-          <a:p>
-            <a:pPr algn="ctr"/>
-            <a:endParaRPr/>
-          </a:p>
-          <a:p>
-            <a:pPr algn="ctr"/>
-            <a:endParaRPr lang="en-US" dirty="0" smtClean="0"/>
-          </a:p>
-          <a:p>
-            <a:pPr algn="ctr"/>
-            <a:endParaRPr lang="en-US" dirty="0"/>
-          </a:p>
-        </p:txBody>
-      </p:sp>
-      <p:sp>
-        <p:nvSpPr>
-          <p:cNvPr id="64" name="Rectangle 63"/>
-          <p:cNvSpPr/>
-          <p:nvPr/>
-        </p:nvSpPr>
-        <p:spPr>
-          <a:xfrm flipV="1">
-            <a:off x="6666775" y="1645379"/>
-            <a:ext cx="1828800" cy="187261"/>
-          </a:xfrm>
-          <a:prstGeom prst="rect">
-            <a:avLst/>
-          </a:prstGeom>
-        </p:spPr>
-        <p:style>
-          <a:lnRef idx="1">
-            <a:schemeClr val="accent1"/>
-          </a:lnRef>
-          <a:fillRef idx="3">
-            <a:schemeClr val="accent1"/>
-          </a:fillRef>
-          <a:effectRef idx="2">
-            <a:schemeClr val="accent1"/>
-          </a:effectRef>
-          <a:fontRef idx="minor">
-            <a:schemeClr val="lt1"/>
-          </a:fontRef>
-        </p:style>
-        <p:txBody>
-          <a:bodyPr rtlCol="0" anchor="ctr"/>
-          <a:lstStyle/>
-          <a:p>
-            <a:pPr algn="ctr"/>
-            <a:endParaRPr lang="en-US" dirty="0" smtClean="0"/>
-          </a:p>
-          <a:p>
-            <a:pPr algn="ctr"/>
-            <a:endParaRPr/>
-          </a:p>
-          <a:p>
-            <a:pPr algn="ctr"/>
-            <a:endParaRPr lang="en-US" dirty="0" smtClean="0"/>
-          </a:p>
-          <a:p>
-            <a:pPr algn="ctr"/>
-            <a:endParaRPr lang="en-US" dirty="0"/>
-          </a:p>
-        </p:txBody>
-      </p:sp>
-      <p:sp>
-        <p:nvSpPr>
-          <p:cNvPr id="65" name="Rectangle 64"/>
-          <p:cNvSpPr/>
-          <p:nvPr/>
-        </p:nvSpPr>
-        <p:spPr>
-          <a:xfrm>
-            <a:off x="8132068" y="1649760"/>
-            <a:ext cx="182880" cy="182880"/>
-          </a:xfrm>
-          <a:prstGeom prst="rect">
-            <a:avLst/>
-          </a:prstGeom>
-          <a:solidFill>
-            <a:schemeClr val="tx1"/>
-          </a:solidFill>
-        </p:spPr>
-        <p:style>
-          <a:lnRef idx="1">
-            <a:schemeClr val="accent1"/>
-          </a:lnRef>
-          <a:fillRef idx="3">
-            <a:schemeClr val="accent1"/>
-          </a:fillRef>
-          <a:effectRef idx="2">
-            <a:schemeClr val="accent1"/>
-          </a:effectRef>
-          <a:fontRef idx="minor">
-            <a:schemeClr val="lt1"/>
-          </a:fontRef>
-        </p:style>
-        <p:txBody>
-          <a:bodyPr rtlCol="0" anchor="ctr"/>
-          <a:lstStyle/>
-          <a:p>
-            <a:pPr algn="ctr"/>
-            <a:endParaRPr lang="en-US"/>
-          </a:p>
-        </p:txBody>
-      </p:sp>
-      <p:sp>
-        <p:nvSpPr>
-          <p:cNvPr id="66" name="Rectangle 65"/>
-          <p:cNvSpPr/>
-          <p:nvPr/>
-        </p:nvSpPr>
-        <p:spPr>
-          <a:xfrm>
-            <a:off x="3583813" y="1645379"/>
-            <a:ext cx="182880" cy="182880"/>
-          </a:xfrm>
-          <a:prstGeom prst="rect">
-            <a:avLst/>
-          </a:prstGeom>
-          <a:solidFill>
-            <a:schemeClr val="tx1"/>
-          </a:solidFill>
-        </p:spPr>
-        <p:style>
-          <a:lnRef idx="1">
-            <a:schemeClr val="accent1"/>
-          </a:lnRef>
-          <a:fillRef idx="3">
-            <a:schemeClr val="accent1"/>
-          </a:fillRef>
-          <a:effectRef idx="2">
-            <a:schemeClr val="accent1"/>
-          </a:effectRef>
-          <a:fontRef idx="minor">
-            <a:schemeClr val="lt1"/>
-          </a:fontRef>
-        </p:style>
-        <p:txBody>
-          <a:bodyPr rtlCol="0" anchor="ctr"/>
-          <a:lstStyle/>
-          <a:p>
-            <a:pPr algn="ctr"/>
-            <a:endParaRPr lang="en-US"/>
-          </a:p>
-        </p:txBody>
-      </p:sp>
-      <p:sp>
-        <p:nvSpPr>
-          <p:cNvPr id="67" name="Rectangle 66"/>
-          <p:cNvSpPr/>
-          <p:nvPr/>
-        </p:nvSpPr>
-        <p:spPr>
-          <a:xfrm>
-            <a:off x="4951546" y="1645379"/>
-            <a:ext cx="182880" cy="182880"/>
-          </a:xfrm>
-          <a:prstGeom prst="rect">
-            <a:avLst/>
-          </a:prstGeom>
-          <a:solidFill>
-            <a:schemeClr val="tx1"/>
-          </a:solidFill>
-        </p:spPr>
-        <p:style>
-          <a:lnRef idx="1">
-            <a:schemeClr val="accent1"/>
-          </a:lnRef>
-          <a:fillRef idx="3">
-            <a:schemeClr val="accent1"/>
-          </a:fillRef>
-          <a:effectRef idx="2">
-            <a:schemeClr val="accent1"/>
-          </a:effectRef>
-          <a:fontRef idx="minor">
-            <a:schemeClr val="lt1"/>
-          </a:fontRef>
-        </p:style>
-        <p:txBody>
-          <a:bodyPr rtlCol="0" anchor="ctr"/>
-          <a:lstStyle/>
-          <a:p>
-            <a:pPr algn="ctr"/>
-            <a:endParaRPr lang="en-US"/>
-          </a:p>
-        </p:txBody>
-      </p:sp>
-      <p:sp>
-        <p:nvSpPr>
-          <p:cNvPr id="69" name="Rectangle 68"/>
-          <p:cNvSpPr/>
-          <p:nvPr/>
-        </p:nvSpPr>
-        <p:spPr>
-          <a:xfrm rot="5400000" flipV="1">
-            <a:off x="278219" y="2354838"/>
-            <a:ext cx="365760" cy="187261"/>
-          </a:xfrm>
-          <a:prstGeom prst="rect">
-            <a:avLst/>
-          </a:prstGeom>
-        </p:spPr>
-        <p:style>
-          <a:lnRef idx="1">
-            <a:schemeClr val="accent1"/>
-          </a:lnRef>
-          <a:fillRef idx="3">
-            <a:schemeClr val="accent1"/>
-          </a:fillRef>
-          <a:effectRef idx="2">
-            <a:schemeClr val="accent1"/>
-          </a:effectRef>
-          <a:fontRef idx="minor">
-            <a:schemeClr val="lt1"/>
-          </a:fontRef>
-        </p:style>
-        <p:txBody>
-          <a:bodyPr rtlCol="0" anchor="ctr"/>
-          <a:lstStyle/>
-          <a:p>
-            <a:pPr algn="ctr"/>
-            <a:endParaRPr lang="en-US" dirty="0" smtClean="0"/>
-          </a:p>
-          <a:p>
-            <a:pPr algn="ctr"/>
-            <a:endParaRPr/>
-          </a:p>
-          <a:p>
-            <a:pPr algn="ctr"/>
-            <a:endParaRPr lang="en-US" dirty="0" smtClean="0"/>
-          </a:p>
-          <a:p>
-            <a:pPr algn="ctr"/>
-            <a:endParaRPr lang="en-US" dirty="0"/>
-          </a:p>
-        </p:txBody>
-      </p:sp>
-      <p:sp>
-        <p:nvSpPr>
-          <p:cNvPr id="70" name="Rectangle 69"/>
-          <p:cNvSpPr/>
-          <p:nvPr/>
-        </p:nvSpPr>
-        <p:spPr>
-          <a:xfrm rot="5400000" flipV="1">
-            <a:off x="278225" y="2785735"/>
-            <a:ext cx="365760" cy="187261"/>
-          </a:xfrm>
-          <a:prstGeom prst="rect">
-            <a:avLst/>
-          </a:prstGeom>
-        </p:spPr>
-        <p:style>
-          <a:lnRef idx="1">
-            <a:schemeClr val="accent1"/>
-          </a:lnRef>
-          <a:fillRef idx="3">
-            <a:schemeClr val="accent1"/>
-          </a:fillRef>
-          <a:effectRef idx="2">
-            <a:schemeClr val="accent1"/>
-          </a:effectRef>
-          <a:fontRef idx="minor">
-            <a:schemeClr val="lt1"/>
-          </a:fontRef>
-        </p:style>
-        <p:txBody>
-          <a:bodyPr rtlCol="0" anchor="ctr"/>
-          <a:lstStyle/>
-          <a:p>
-            <a:pPr algn="ctr"/>
-            <a:endParaRPr lang="en-US" dirty="0" smtClean="0"/>
-          </a:p>
-          <a:p>
-            <a:pPr algn="ctr"/>
-            <a:endParaRPr/>
-          </a:p>
-          <a:p>
-            <a:pPr algn="ctr"/>
-            <a:endParaRPr lang="en-US" dirty="0" smtClean="0"/>
-          </a:p>
-          <a:p>
-            <a:pPr algn="ctr"/>
-            <a:endParaRPr lang="en-US" dirty="0"/>
-          </a:p>
-        </p:txBody>
-      </p:sp>
-      <p:sp>
-        <p:nvSpPr>
-          <p:cNvPr id="79" name="Rectangle 78"/>
-          <p:cNvSpPr/>
-          <p:nvPr/>
-        </p:nvSpPr>
-        <p:spPr>
-          <a:xfrm rot="5400000" flipV="1">
-            <a:off x="278218" y="3216632"/>
-            <a:ext cx="365760" cy="187261"/>
-          </a:xfrm>
-          <a:prstGeom prst="rect">
-            <a:avLst/>
-          </a:prstGeom>
-        </p:spPr>
-        <p:style>
-          <a:lnRef idx="1">
-            <a:schemeClr val="accent1"/>
-          </a:lnRef>
-          <a:fillRef idx="3">
-            <a:schemeClr val="accent1"/>
-          </a:fillRef>
-          <a:effectRef idx="2">
-            <a:schemeClr val="accent1"/>
-          </a:effectRef>
-          <a:fontRef idx="minor">
-            <a:schemeClr val="lt1"/>
-          </a:fontRef>
-        </p:style>
-        <p:txBody>
-          <a:bodyPr rtlCol="0" anchor="ctr"/>
-          <a:lstStyle/>
-          <a:p>
-            <a:pPr algn="ctr"/>
-            <a:endParaRPr lang="en-US" dirty="0" smtClean="0"/>
-          </a:p>
-          <a:p>
-            <a:pPr algn="ctr"/>
-            <a:endParaRPr/>
-          </a:p>
-          <a:p>
-            <a:pPr algn="ctr"/>
-            <a:endParaRPr lang="en-US" dirty="0" smtClean="0"/>
-          </a:p>
-          <a:p>
-            <a:pPr algn="ctr"/>
-            <a:endParaRPr lang="en-US" dirty="0"/>
-          </a:p>
-        </p:txBody>
-      </p:sp>
-      <p:sp>
-        <p:nvSpPr>
-          <p:cNvPr id="80" name="Rectangle 79"/>
-          <p:cNvSpPr/>
-          <p:nvPr/>
-        </p:nvSpPr>
-        <p:spPr>
-          <a:xfrm rot="5400000" flipV="1">
-            <a:off x="278223" y="3647530"/>
-            <a:ext cx="365760" cy="187258"/>
-          </a:xfrm>
-          <a:prstGeom prst="rect">
-            <a:avLst/>
-          </a:prstGeom>
-        </p:spPr>
-        <p:style>
-          <a:lnRef idx="1">
-            <a:schemeClr val="accent1"/>
-          </a:lnRef>
-          <a:fillRef idx="3">
-            <a:schemeClr val="accent1"/>
-          </a:fillRef>
-          <a:effectRef idx="2">
-            <a:schemeClr val="accent1"/>
-          </a:effectRef>
-          <a:fontRef idx="minor">
-            <a:schemeClr val="lt1"/>
-          </a:fontRef>
-        </p:style>
-        <p:txBody>
-          <a:bodyPr rtlCol="0" anchor="ctr"/>
-          <a:lstStyle/>
-          <a:p>
-            <a:pPr algn="ctr"/>
-            <a:endParaRPr lang="en-US" dirty="0" smtClean="0"/>
-          </a:p>
-          <a:p>
-            <a:pPr algn="ctr"/>
-            <a:endParaRPr/>
-          </a:p>
-          <a:p>
-            <a:pPr algn="ctr"/>
-            <a:endParaRPr lang="en-US" dirty="0" smtClean="0"/>
-          </a:p>
-          <a:p>
-            <a:pPr algn="ctr"/>
-            <a:endParaRPr lang="en-US" dirty="0"/>
-          </a:p>
-        </p:txBody>
-      </p:sp>
-      <p:sp>
-        <p:nvSpPr>
-          <p:cNvPr id="81" name="Rectangle 80"/>
-          <p:cNvSpPr/>
-          <p:nvPr/>
-        </p:nvSpPr>
-        <p:spPr>
-          <a:xfrm>
-            <a:off x="367467" y="2448469"/>
-            <a:ext cx="182880" cy="182880"/>
-          </a:xfrm>
-          <a:prstGeom prst="rect">
-            <a:avLst/>
-          </a:prstGeom>
-          <a:solidFill>
-            <a:schemeClr val="tx1"/>
-          </a:solidFill>
-        </p:spPr>
-        <p:style>
-          <a:lnRef idx="1">
-            <a:schemeClr val="accent1"/>
-          </a:lnRef>
-          <a:fillRef idx="3">
-            <a:schemeClr val="accent1"/>
-          </a:fillRef>
-          <a:effectRef idx="2">
-            <a:schemeClr val="accent1"/>
-          </a:effectRef>
-          <a:fontRef idx="minor">
-            <a:schemeClr val="lt1"/>
-          </a:fontRef>
-        </p:style>
-        <p:txBody>
-          <a:bodyPr rtlCol="0" anchor="ctr"/>
-          <a:lstStyle/>
-          <a:p>
-            <a:pPr algn="ctr"/>
-            <a:endParaRPr lang="en-US"/>
-          </a:p>
-        </p:txBody>
-      </p:sp>
-      <p:sp>
-        <p:nvSpPr>
-          <p:cNvPr id="86" name="Rectangle 85"/>
-          <p:cNvSpPr/>
-          <p:nvPr/>
-        </p:nvSpPr>
-        <p:spPr>
-          <a:xfrm>
-            <a:off x="367474" y="2696485"/>
-            <a:ext cx="182880" cy="182880"/>
-          </a:xfrm>
-          <a:prstGeom prst="rect">
-            <a:avLst/>
-          </a:prstGeom>
-          <a:solidFill>
-            <a:schemeClr val="tx1"/>
-          </a:solidFill>
-        </p:spPr>
-        <p:style>
-          <a:lnRef idx="1">
-            <a:schemeClr val="accent1"/>
-          </a:lnRef>
-          <a:fillRef idx="3">
-            <a:schemeClr val="accent1"/>
-          </a:fillRef>
-          <a:effectRef idx="2">
-            <a:schemeClr val="accent1"/>
-          </a:effectRef>
-          <a:fontRef idx="minor">
-            <a:schemeClr val="lt1"/>
-          </a:fontRef>
-        </p:style>
-        <p:txBody>
-          <a:bodyPr rtlCol="0" anchor="ctr"/>
-          <a:lstStyle/>
-          <a:p>
-            <a:pPr algn="ctr"/>
-            <a:endParaRPr lang="en-US"/>
-          </a:p>
-        </p:txBody>
-      </p:sp>
-      <p:sp>
-        <p:nvSpPr>
-          <p:cNvPr id="87" name="Rectangle 86"/>
-          <p:cNvSpPr/>
-          <p:nvPr/>
-        </p:nvSpPr>
-        <p:spPr>
-          <a:xfrm>
-            <a:off x="367467" y="3558279"/>
-            <a:ext cx="182880" cy="182880"/>
-          </a:xfrm>
-          <a:prstGeom prst="rect">
-            <a:avLst/>
-          </a:prstGeom>
-          <a:solidFill>
-            <a:schemeClr val="tx1"/>
-          </a:solidFill>
-        </p:spPr>
-        <p:style>
-          <a:lnRef idx="1">
-            <a:schemeClr val="accent1"/>
-          </a:lnRef>
-          <a:fillRef idx="3">
-            <a:schemeClr val="accent1"/>
-          </a:fillRef>
-          <a:effectRef idx="2">
-            <a:schemeClr val="accent1"/>
-          </a:effectRef>
-          <a:fontRef idx="minor">
-            <a:schemeClr val="lt1"/>
-          </a:fontRef>
-        </p:style>
-        <p:txBody>
-          <a:bodyPr rtlCol="0" anchor="ctr"/>
-          <a:lstStyle/>
-          <a:p>
-            <a:pPr algn="ctr"/>
-            <a:endParaRPr lang="en-US"/>
-          </a:p>
-        </p:txBody>
-      </p:sp>
-      <p:sp>
-        <p:nvSpPr>
-          <p:cNvPr id="153" name="Rectangle 152"/>
-          <p:cNvSpPr/>
-          <p:nvPr/>
-        </p:nvSpPr>
-        <p:spPr>
-          <a:xfrm>
-            <a:off x="4743062" y="4587724"/>
-            <a:ext cx="182880" cy="182880"/>
-          </a:xfrm>
-          <a:prstGeom prst="rect">
-            <a:avLst/>
-          </a:prstGeom>
-          <a:solidFill>
-            <a:schemeClr val="accent5"/>
-          </a:solidFill>
-        </p:spPr>
-        <p:style>
-          <a:lnRef idx="1">
-            <a:schemeClr val="accent1"/>
-          </a:lnRef>
-          <a:fillRef idx="3">
-            <a:schemeClr val="accent1"/>
-          </a:fillRef>
-          <a:effectRef idx="2">
-            <a:schemeClr val="accent1"/>
-          </a:effectRef>
-          <a:fontRef idx="minor">
-            <a:schemeClr val="lt1"/>
-          </a:fontRef>
-        </p:style>
-        <p:txBody>
-          <a:bodyPr rtlCol="0" anchor="ctr"/>
-          <a:lstStyle/>
-          <a:p>
-            <a:pPr algn="ctr"/>
-            <a:endParaRPr lang="en-US"/>
-          </a:p>
-        </p:txBody>
-      </p:sp>
-      <p:sp>
-        <p:nvSpPr>
-          <p:cNvPr id="154" name="Rectangle 153"/>
-          <p:cNvSpPr/>
-          <p:nvPr/>
-        </p:nvSpPr>
-        <p:spPr>
-          <a:xfrm>
-            <a:off x="4925942" y="4587724"/>
-            <a:ext cx="182880" cy="182880"/>
-          </a:xfrm>
-          <a:prstGeom prst="rect">
-            <a:avLst/>
-          </a:prstGeom>
-          <a:solidFill>
-            <a:schemeClr val="accent5"/>
-          </a:solidFill>
-        </p:spPr>
-        <p:style>
-          <a:lnRef idx="1">
-            <a:schemeClr val="accent1"/>
-          </a:lnRef>
-          <a:fillRef idx="3">
-            <a:schemeClr val="accent1"/>
-          </a:fillRef>
-          <a:effectRef idx="2">
-            <a:schemeClr val="accent1"/>
-          </a:effectRef>
-          <a:fontRef idx="minor">
-            <a:schemeClr val="lt1"/>
-          </a:fontRef>
-        </p:style>
-        <p:txBody>
-          <a:bodyPr rtlCol="0" anchor="ctr"/>
-          <a:lstStyle/>
-          <a:p>
-            <a:pPr algn="ctr"/>
-            <a:endParaRPr lang="en-US"/>
-          </a:p>
-        </p:txBody>
-      </p:sp>
-      <p:sp>
-        <p:nvSpPr>
-          <p:cNvPr id="151" name="Rectangle 150"/>
-          <p:cNvSpPr/>
-          <p:nvPr/>
-        </p:nvSpPr>
-        <p:spPr>
-          <a:xfrm>
-            <a:off x="4743062" y="4770604"/>
-            <a:ext cx="182880" cy="182880"/>
-          </a:xfrm>
-          <a:prstGeom prst="rect">
-            <a:avLst/>
-          </a:prstGeom>
-          <a:solidFill>
-            <a:schemeClr val="bg1">
-              <a:lumMod val="50000"/>
-            </a:schemeClr>
-          </a:solidFill>
-        </p:spPr>
-        <p:style>
-          <a:lnRef idx="1">
-            <a:schemeClr val="accent1"/>
-          </a:lnRef>
-          <a:fillRef idx="3">
-            <a:schemeClr val="accent1"/>
-          </a:fillRef>
-          <a:effectRef idx="2">
-            <a:schemeClr val="accent1"/>
-          </a:effectRef>
-          <a:fontRef idx="minor">
-            <a:schemeClr val="lt1"/>
-          </a:fontRef>
-        </p:style>
-        <p:txBody>
-          <a:bodyPr rtlCol="0" anchor="ctr"/>
-          <a:lstStyle/>
-          <a:p>
-            <a:pPr algn="ctr"/>
-            <a:endParaRPr lang="en-US"/>
-          </a:p>
-        </p:txBody>
-      </p:sp>
-      <p:sp>
-        <p:nvSpPr>
-          <p:cNvPr id="152" name="Rectangle 151"/>
-          <p:cNvSpPr/>
-          <p:nvPr/>
-        </p:nvSpPr>
-        <p:spPr>
-          <a:xfrm>
-            <a:off x="4925942" y="4770604"/>
-            <a:ext cx="182880" cy="182880"/>
-          </a:xfrm>
-          <a:prstGeom prst="rect">
-            <a:avLst/>
-          </a:prstGeom>
-          <a:solidFill>
-            <a:schemeClr val="bg1">
-              <a:lumMod val="50000"/>
             </a:schemeClr>
           </a:solidFill>
         </p:spPr>

</xml_diff>

<commit_message>
ICPP: Make pack image numbers easier to read.
git-svn-id: svn://localhost/subsetter/trunk@109 803cb72c-d64d-0410-ae51-a9422f8e9f96
</commit_message>
<xml_diff>
--- a/papers/2010-ICPP/images/pack.pptx
+++ b/papers/2010-ICPP/images/pack.pptx
@@ -3251,10 +3251,10 @@
           <a:p>
             <a:pPr algn="ctr"/>
             <a:r>
-              <a:rPr lang="en-US" dirty="0" smtClean="0"/>
+              <a:rPr lang="en-US" sz="2000" b="1" dirty="0" smtClean="0"/>
               <a:t>0</a:t>
             </a:r>
-            <a:endParaRPr lang="en-US" dirty="0"/>
+            <a:endParaRPr lang="en-US" sz="2000" b="1" dirty="0"/>
           </a:p>
         </p:txBody>
       </p:sp>
@@ -3966,10 +3966,10 @@
           <a:p>
             <a:pPr algn="ctr"/>
             <a:r>
-              <a:rPr lang="en-US" dirty="0" smtClean="0"/>
+              <a:rPr lang="en-US" sz="2000" b="1" dirty="0" smtClean="0"/>
               <a:t>0</a:t>
             </a:r>
-            <a:endParaRPr lang="en-US" dirty="0"/>
+            <a:endParaRPr lang="en-US" sz="2000" b="1" dirty="0"/>
           </a:p>
         </p:txBody>
       </p:sp>
@@ -4011,10 +4011,10 @@
           <a:p>
             <a:pPr algn="ctr"/>
             <a:r>
-              <a:rPr lang="en-US" dirty="0" smtClean="0"/>
+              <a:rPr lang="en-US" sz="2000" b="1" dirty="0" smtClean="0"/>
               <a:t>3</a:t>
             </a:r>
-            <a:endParaRPr lang="en-US" dirty="0"/>
+            <a:endParaRPr lang="en-US" sz="2000" b="1" dirty="0"/>
           </a:p>
         </p:txBody>
       </p:sp>
@@ -4056,10 +4056,10 @@
           <a:p>
             <a:pPr algn="ctr"/>
             <a:r>
-              <a:rPr lang="en-US" dirty="0" smtClean="0"/>
+              <a:rPr lang="en-US" sz="2000" b="1" dirty="0" smtClean="0"/>
               <a:t>2</a:t>
             </a:r>
-            <a:endParaRPr lang="en-US" dirty="0"/>
+            <a:endParaRPr lang="en-US" sz="2000" b="1" dirty="0"/>
           </a:p>
         </p:txBody>
       </p:sp>

</xml_diff>